<commit_message>
add train or test feature data
</commit_message>
<xml_diff>
--- a/2021/doc/進捗0928.pptx
+++ b/2021/doc/進捗0928.pptx
@@ -3798,35 +3798,6 @@
           </a:p>
         </p:txBody>
       </p:sp>
-      <p:pic>
-        <p:nvPicPr>
-          <p:cNvPr id="4" name="図 3" descr="図形, 矢印&#10;&#10;自動的に生成された説明">
-            <a:extLst>
-              <a:ext uri="{FF2B5EF4-FFF2-40B4-BE49-F238E27FC236}">
-                <a16:creationId xmlns:a16="http://schemas.microsoft.com/office/drawing/2014/main" id="{827257D3-8D1E-A246-A20B-8350ED9E7FB7}"/>
-              </a:ext>
-            </a:extLst>
-          </p:cNvPr>
-          <p:cNvPicPr>
-            <a:picLocks noChangeAspect="1"/>
-          </p:cNvPicPr>
-          <p:nvPr/>
-        </p:nvPicPr>
-        <p:blipFill rotWithShape="1">
-          <a:blip r:embed="rId2"/>
-          <a:srcRect t="50000"/>
-          <a:stretch/>
-        </p:blipFill>
-        <p:spPr>
-          <a:xfrm>
-            <a:off x="2750431" y="1862091"/>
-            <a:ext cx="6244886" cy="4995909"/>
-          </a:xfrm>
-          <a:prstGeom prst="rect">
-            <a:avLst/>
-          </a:prstGeom>
-        </p:spPr>
-      </p:pic>
       <p:sp>
         <p:nvSpPr>
           <p:cNvPr id="6" name="テキスト ボックス 5">
@@ -3907,7 +3878,12 @@
             <p:ph type="title"/>
           </p:nvPr>
         </p:nvSpPr>
-        <p:spPr/>
+        <p:spPr>
+          <a:xfrm>
+            <a:off x="838200" y="208703"/>
+            <a:ext cx="10515600" cy="1325563"/>
+          </a:xfrm>
+        </p:spPr>
         <p:txBody>
           <a:bodyPr>
             <a:normAutofit/>
@@ -3950,7 +3926,7 @@
         </p:blipFill>
         <p:spPr>
           <a:xfrm>
-            <a:off x="1248936" y="1371601"/>
+            <a:off x="962717" y="1326996"/>
             <a:ext cx="8831876" cy="5322301"/>
           </a:xfrm>
           <a:prstGeom prst="rect">
@@ -3972,7 +3948,7 @@
         </p:nvSpPr>
         <p:spPr>
           <a:xfrm>
-            <a:off x="1248936" y="1371600"/>
+            <a:off x="962717" y="1326995"/>
             <a:ext cx="1774903" cy="1325563"/>
           </a:xfrm>
           <a:prstGeom prst="rect">
@@ -3988,6 +3964,65 @@
           </a:bodyPr>
           <a:lstStyle/>
           <a:p>
+            <a:endParaRPr kumimoji="1" lang="ja-JP" altLang="en-US"/>
+          </a:p>
+        </p:txBody>
+      </p:sp>
+      <p:sp>
+        <p:nvSpPr>
+          <p:cNvPr id="6" name="テキスト ボックス 5">
+            <a:extLst>
+              <a:ext uri="{FF2B5EF4-FFF2-40B4-BE49-F238E27FC236}">
+                <a16:creationId xmlns:a16="http://schemas.microsoft.com/office/drawing/2014/main" id="{EA7FC7A1-974A-0D42-A5A4-905E1C85D8A8}"/>
+              </a:ext>
+            </a:extLst>
+          </p:cNvPr>
+          <p:cNvSpPr txBox="1"/>
+          <p:nvPr/>
+        </p:nvSpPr>
+        <p:spPr>
+          <a:xfrm>
+            <a:off x="9929842" y="1461417"/>
+            <a:ext cx="2262158" cy="646331"/>
+          </a:xfrm>
+          <a:prstGeom prst="rect">
+            <a:avLst/>
+          </a:prstGeom>
+          <a:noFill/>
+        </p:spPr>
+        <p:txBody>
+          <a:bodyPr wrap="none" rtlCol="0">
+            <a:spAutoFit/>
+          </a:bodyPr>
+          <a:lstStyle/>
+          <a:p>
+            <a:r>
+              <a:rPr kumimoji="1" lang="ja-JP" altLang="en-US">
+                <a:solidFill>
+                  <a:srgbClr val="00B050"/>
+                </a:solidFill>
+              </a:rPr>
+              <a:t>緑</a:t>
+            </a:r>
+            <a:r>
+              <a:rPr kumimoji="1" lang="ja-JP" altLang="en-US"/>
+              <a:t>：クリプトサイト</a:t>
+            </a:r>
+            <a:endParaRPr kumimoji="1" lang="en-US" altLang="ja-JP" dirty="0"/>
+          </a:p>
+          <a:p>
+            <a:r>
+              <a:rPr lang="ja-JP" altLang="en-US">
+                <a:solidFill>
+                  <a:srgbClr val="FF0000"/>
+                </a:solidFill>
+              </a:rPr>
+              <a:t>赤</a:t>
+            </a:r>
+            <a:r>
+              <a:rPr lang="ja-JP" altLang="en-US"/>
+              <a:t>：凹み</a:t>
+            </a:r>
             <a:endParaRPr kumimoji="1" lang="ja-JP" altLang="en-US"/>
           </a:p>
         </p:txBody>
@@ -4040,10 +4075,24 @@
         </p:nvSpPr>
         <p:spPr/>
         <p:txBody>
-          <a:bodyPr/>
-          <a:lstStyle/>
-          <a:p>
-            <a:endParaRPr kumimoji="1" lang="ja-JP" altLang="en-US"/>
+          <a:bodyPr>
+            <a:normAutofit/>
+          </a:bodyPr>
+          <a:lstStyle/>
+          <a:p>
+            <a:r>
+              <a:rPr lang="ja-JP" altLang="en-US" sz="3600"/>
+              <a:t>アルファ球近傍</a:t>
+            </a:r>
+            <a:r>
+              <a:rPr lang="en-US" altLang="ja-JP" sz="3600" dirty="0"/>
+              <a:t>(5Å)</a:t>
+            </a:r>
+            <a:r>
+              <a:rPr lang="ja-JP" altLang="en-US" sz="3600"/>
+              <a:t>の残基のヒストグラムの分布が異なった残基</a:t>
+            </a:r>
+            <a:endParaRPr kumimoji="1" lang="ja-JP" altLang="en-US" sz="3600"/>
           </a:p>
         </p:txBody>
       </p:sp>
@@ -4061,8 +4110,8 @@
         </p:nvSpPr>
         <p:spPr>
           <a:xfrm>
-            <a:off x="1064381" y="5988203"/>
-            <a:ext cx="4054315" cy="369332"/>
+            <a:off x="523208" y="5988203"/>
+            <a:ext cx="5131533" cy="369332"/>
           </a:xfrm>
           <a:prstGeom prst="rect">
             <a:avLst/>
@@ -4092,7 +4141,23 @@
             </a:r>
             <a:r>
               <a:rPr lang="ja-JP" altLang="en-US"/>
-              <a:t> name: GLY, p value: 0.00038</a:t>
+              <a:t> name: GLY</a:t>
+            </a:r>
+            <a:r>
+              <a:rPr lang="en-US" altLang="ja-JP" dirty="0"/>
+              <a:t>(</a:t>
+            </a:r>
+            <a:r>
+              <a:rPr lang="ja-JP" altLang="en-US"/>
+              <a:t>グリシン</a:t>
+            </a:r>
+            <a:r>
+              <a:rPr lang="en-US" altLang="ja-JP" dirty="0"/>
+              <a:t>)</a:t>
+            </a:r>
+            <a:r>
+              <a:rPr lang="ja-JP" altLang="en-US"/>
+              <a:t>, p value: 0.00038</a:t>
             </a:r>
           </a:p>
         </p:txBody>
@@ -4111,8 +4176,8 @@
         </p:nvSpPr>
         <p:spPr>
           <a:xfrm>
-            <a:off x="6381143" y="5972145"/>
-            <a:ext cx="4047903" cy="369332"/>
+            <a:off x="6005347" y="5988203"/>
+            <a:ext cx="5216493" cy="369332"/>
           </a:xfrm>
           <a:prstGeom prst="rect">
             <a:avLst/>
@@ -4142,7 +4207,23 @@
             </a:r>
             <a:r>
               <a:rPr lang="ja-JP" altLang="en-US"/>
-              <a:t> name: TYR, p value: 0.00757</a:t>
+              <a:t> name: TYR</a:t>
+            </a:r>
+            <a:r>
+              <a:rPr lang="en-US" altLang="ja-JP" dirty="0"/>
+              <a:t> (</a:t>
+            </a:r>
+            <a:r>
+              <a:rPr lang="ja-JP" altLang="en-US"/>
+              <a:t>チロシン</a:t>
+            </a:r>
+            <a:r>
+              <a:rPr lang="en-US" altLang="ja-JP" dirty="0"/>
+              <a:t>)</a:t>
+            </a:r>
+            <a:r>
+              <a:rPr lang="ja-JP" altLang="en-US"/>
+              <a:t>, p value: 0.00757</a:t>
             </a:r>
           </a:p>
         </p:txBody>
@@ -4168,8 +4249,112 @@
         </p:blipFill>
         <p:spPr>
           <a:xfrm>
-            <a:off x="1064381" y="1843427"/>
+            <a:off x="695817" y="1821821"/>
             <a:ext cx="5195286" cy="3932906"/>
+          </a:xfrm>
+          <a:prstGeom prst="rect">
+            <a:avLst/>
+          </a:prstGeom>
+        </p:spPr>
+      </p:pic>
+      <p:sp>
+        <p:nvSpPr>
+          <p:cNvPr id="6" name="正方形/長方形 5">
+            <a:extLst>
+              <a:ext uri="{FF2B5EF4-FFF2-40B4-BE49-F238E27FC236}">
+                <a16:creationId xmlns:a16="http://schemas.microsoft.com/office/drawing/2014/main" id="{9CDBD18A-5B91-7847-B994-CA1BC516112B}"/>
+              </a:ext>
+            </a:extLst>
+          </p:cNvPr>
+          <p:cNvSpPr/>
+          <p:nvPr/>
+        </p:nvSpPr>
+        <p:spPr>
+          <a:xfrm>
+            <a:off x="1064381" y="6488668"/>
+            <a:ext cx="6883616" cy="369332"/>
+          </a:xfrm>
+          <a:prstGeom prst="rect">
+            <a:avLst/>
+          </a:prstGeom>
+        </p:spPr>
+        <p:txBody>
+          <a:bodyPr wrap="none">
+            <a:spAutoFit/>
+          </a:bodyPr>
+          <a:lstStyle/>
+          <a:p>
+            <a:r>
+              <a:rPr lang="ja-JP" altLang="en-US">
+                <a:latin typeface="YuGothic"/>
+              </a:rPr>
+              <a:t>コロガロフ・シルノフの</a:t>
+            </a:r>
+            <a:r>
+              <a:rPr lang="en-US" altLang="ja-JP" dirty="0">
+                <a:latin typeface="YuGothic"/>
+              </a:rPr>
+              <a:t>2</a:t>
+            </a:r>
+            <a:r>
+              <a:rPr lang="ja-JP" altLang="en-US">
+                <a:latin typeface="YuGothic"/>
+              </a:rPr>
+              <a:t>標本統計に基づく</a:t>
+            </a:r>
+            <a:r>
+              <a:rPr lang="en" altLang="ja-JP" dirty="0">
+                <a:latin typeface="YuGothic"/>
+              </a:rPr>
+              <a:t>P</a:t>
+            </a:r>
+            <a:r>
+              <a:rPr lang="ja-JP" altLang="en-US">
+                <a:latin typeface="YuGothic"/>
+              </a:rPr>
+              <a:t>値で</a:t>
+            </a:r>
+            <a:r>
+              <a:rPr lang="en-US" altLang="ja-JP" dirty="0">
+                <a:latin typeface="YuGothic"/>
+              </a:rPr>
+              <a:t>&lt;0.05</a:t>
+            </a:r>
+            <a:r>
+              <a:rPr lang="ja-JP" altLang="en-US">
+                <a:latin typeface="YuGothic"/>
+              </a:rPr>
+              <a:t>のカラム </a:t>
+            </a:r>
+            <a:endParaRPr lang="ja-JP" altLang="en-US">
+              <a:effectLst/>
+            </a:endParaRPr>
+          </a:p>
+        </p:txBody>
+      </p:sp>
+      <p:pic>
+        <p:nvPicPr>
+          <p:cNvPr id="7" name="図 6" descr="図形, 矢印&#10;&#10;自動的に生成された説明">
+            <a:extLst>
+              <a:ext uri="{FF2B5EF4-FFF2-40B4-BE49-F238E27FC236}">
+                <a16:creationId xmlns:a16="http://schemas.microsoft.com/office/drawing/2014/main" id="{867F7A95-4A73-984C-A3DA-8A6D18013A01}"/>
+              </a:ext>
+            </a:extLst>
+          </p:cNvPr>
+          <p:cNvPicPr>
+            <a:picLocks noChangeAspect="1"/>
+          </p:cNvPicPr>
+          <p:nvPr/>
+        </p:nvPicPr>
+        <p:blipFill rotWithShape="1">
+          <a:blip r:embed="rId2"/>
+          <a:srcRect l="59975" t="87493" r="19614" b="-1"/>
+          <a:stretch/>
+        </p:blipFill>
+        <p:spPr>
+          <a:xfrm>
+            <a:off x="6005347" y="1872992"/>
+            <a:ext cx="5348453" cy="3932906"/>
           </a:xfrm>
           <a:prstGeom prst="rect">
             <a:avLst/>
@@ -4356,8 +4541,8 @@
         </p:blipFill>
         <p:spPr>
           <a:xfrm>
-            <a:off x="239257" y="2037817"/>
-            <a:ext cx="6057371" cy="4455058"/>
+            <a:off x="2346837" y="1426741"/>
+            <a:ext cx="7176304" cy="5278008"/>
           </a:xfrm>
           <a:prstGeom prst="rect">
             <a:avLst/>

</xml_diff>

<commit_message>
add pdb data etc...
</commit_message>
<xml_diff>
--- a/2021/doc/進捗0928.pptx
+++ b/2021/doc/進捗0928.pptx
@@ -11,10 +11,11 @@
     <p:sldId id="276" r:id="rId5"/>
     <p:sldId id="279" r:id="rId6"/>
     <p:sldId id="280" r:id="rId7"/>
-    <p:sldId id="278" r:id="rId8"/>
-    <p:sldId id="271" r:id="rId9"/>
-    <p:sldId id="272" r:id="rId10"/>
-    <p:sldId id="273" r:id="rId11"/>
+    <p:sldId id="281" r:id="rId8"/>
+    <p:sldId id="278" r:id="rId9"/>
+    <p:sldId id="271" r:id="rId10"/>
+    <p:sldId id="272" r:id="rId11"/>
+    <p:sldId id="273" r:id="rId12"/>
   </p:sldIdLst>
   <p:sldSz cx="12192000" cy="6858000"/>
   <p:notesSz cx="6858000" cy="9144000"/>
@@ -3756,6 +3757,100 @@
       </p:sp>
       <p:pic>
         <p:nvPicPr>
+          <p:cNvPr id="4" name="図 3" descr="グラフィカル ユーザー インターフェイス&#10;&#10;中程度の精度で自動的に生成された説明">
+            <a:extLst>
+              <a:ext uri="{FF2B5EF4-FFF2-40B4-BE49-F238E27FC236}">
+                <a16:creationId xmlns:a16="http://schemas.microsoft.com/office/drawing/2014/main" id="{37E0FB6B-530C-CD40-AF37-E83445370764}"/>
+              </a:ext>
+            </a:extLst>
+          </p:cNvPr>
+          <p:cNvPicPr>
+            <a:picLocks noChangeAspect="1"/>
+          </p:cNvPicPr>
+          <p:nvPr/>
+        </p:nvPicPr>
+        <p:blipFill>
+          <a:blip r:embed="rId2"/>
+          <a:stretch>
+            <a:fillRect/>
+          </a:stretch>
+        </p:blipFill>
+        <p:spPr>
+          <a:xfrm>
+            <a:off x="2346837" y="1426741"/>
+            <a:ext cx="7176304" cy="5278008"/>
+          </a:xfrm>
+          <a:prstGeom prst="rect">
+            <a:avLst/>
+          </a:prstGeom>
+        </p:spPr>
+      </p:pic>
+    </p:spTree>
+    <p:extLst>
+      <p:ext uri="{BB962C8B-B14F-4D97-AF65-F5344CB8AC3E}">
+        <p14:creationId xmlns:p14="http://schemas.microsoft.com/office/powerpoint/2010/main" val="1082442366"/>
+      </p:ext>
+    </p:extLst>
+  </p:cSld>
+  <p:clrMapOvr>
+    <a:masterClrMapping/>
+  </p:clrMapOvr>
+</p:sld>
+</file>
+
+<file path=ppt/slides/slide11.xml><?xml version="1.0" encoding="utf-8"?>
+<p:sld xmlns:a="http://schemas.openxmlformats.org/drawingml/2006/main" xmlns:r="http://schemas.openxmlformats.org/officeDocument/2006/relationships" xmlns:p="http://schemas.openxmlformats.org/presentationml/2006/main">
+  <p:cSld>
+    <p:spTree>
+      <p:nvGrpSpPr>
+        <p:cNvPr id="1" name=""/>
+        <p:cNvGrpSpPr/>
+        <p:nvPr/>
+      </p:nvGrpSpPr>
+      <p:grpSpPr>
+        <a:xfrm>
+          <a:off x="0" y="0"/>
+          <a:ext cx="0" cy="0"/>
+          <a:chOff x="0" y="0"/>
+          <a:chExt cx="0" cy="0"/>
+        </a:xfrm>
+      </p:grpSpPr>
+      <p:sp>
+        <p:nvSpPr>
+          <p:cNvPr id="2" name="タイトル 1">
+            <a:extLst>
+              <a:ext uri="{FF2B5EF4-FFF2-40B4-BE49-F238E27FC236}">
+                <a16:creationId xmlns:a16="http://schemas.microsoft.com/office/drawing/2014/main" id="{D05BC586-F069-884B-BE37-565936750D51}"/>
+              </a:ext>
+            </a:extLst>
+          </p:cNvPr>
+          <p:cNvSpPr>
+            <a:spLocks noGrp="1"/>
+          </p:cNvSpPr>
+          <p:nvPr>
+            <p:ph type="title"/>
+          </p:nvPr>
+        </p:nvSpPr>
+        <p:spPr>
+          <a:xfrm>
+            <a:off x="424453" y="365125"/>
+            <a:ext cx="11439598" cy="1325563"/>
+          </a:xfrm>
+        </p:spPr>
+        <p:txBody>
+          <a:bodyPr/>
+          <a:lstStyle/>
+          <a:p>
+            <a:r>
+              <a:rPr lang="en-US" altLang="ja-JP" dirty="0"/>
+              <a:t>Pocket Similarity Search using Multi-Sketches</a:t>
+            </a:r>
+            <a:endParaRPr kumimoji="1" lang="ja-JP" altLang="en-US"/>
+          </a:p>
+        </p:txBody>
+      </p:sp>
+      <p:pic>
+        <p:nvPicPr>
           <p:cNvPr id="6" name="図 5" descr="テーブル&#10;&#10;自動的に生成された説明">
             <a:extLst>
               <a:ext uri="{FF2B5EF4-FFF2-40B4-BE49-F238E27FC236}">
@@ -4177,7 +4272,7 @@
         <p:spPr>
           <a:xfrm>
             <a:off x="5271206" y="5078661"/>
-            <a:ext cx="543739" cy="369332"/>
+            <a:ext cx="646331" cy="369332"/>
           </a:xfrm>
           <a:prstGeom prst="rect">
             <a:avLst/>
@@ -4191,8 +4286,12 @@
           <a:lstStyle/>
           <a:p>
             <a:r>
-              <a:rPr kumimoji="1" lang="en-US" altLang="ja-JP" b="1" dirty="0"/>
-              <a:t>3Å</a:t>
+              <a:rPr lang="ja-JP" altLang="en-US" b="1"/>
+              <a:t>５</a:t>
+            </a:r>
+            <a:r>
+              <a:rPr kumimoji="1" lang="en-US" altLang="ja-JP" b="1" dirty="0" err="1"/>
+              <a:t>Å</a:t>
             </a:r>
             <a:endParaRPr kumimoji="1" lang="ja-JP" altLang="en-US" b="1"/>
           </a:p>
@@ -4852,7 +4951,7 @@
               <a:t>によるチューニング</a:t>
             </a:r>
             <a:r>
-              <a:rPr kumimoji="1" lang="en-US" altLang="ja-JP"/>
+              <a:rPr kumimoji="1" lang="en-US" altLang="ja-JP" dirty="0"/>
               <a:t>(SVM)</a:t>
             </a:r>
             <a:endParaRPr kumimoji="1" lang="ja-JP" altLang="en-US"/>
@@ -5030,10 +5129,73 @@
           <a:bodyPr/>
           <a:lstStyle/>
           <a:p>
-            <a:endParaRPr kumimoji="1" lang="ja-JP" altLang="en-US"/>
-          </a:p>
-        </p:txBody>
-      </p:sp>
+            <a:r>
+              <a:rPr kumimoji="1" lang="ja-JP" altLang="en-US"/>
+              <a:t>特徴量を追加した際の重要特徴量</a:t>
+            </a:r>
+          </a:p>
+        </p:txBody>
+      </p:sp>
+      <p:pic>
+        <p:nvPicPr>
+          <p:cNvPr id="4" name="図 3" descr="グラフ&#10;&#10;自動的に生成された説明">
+            <a:extLst>
+              <a:ext uri="{FF2B5EF4-FFF2-40B4-BE49-F238E27FC236}">
+                <a16:creationId xmlns:a16="http://schemas.microsoft.com/office/drawing/2014/main" id="{D500EAAF-D6B3-244C-BBF4-8DF08FFFF849}"/>
+              </a:ext>
+            </a:extLst>
+          </p:cNvPr>
+          <p:cNvPicPr>
+            <a:picLocks noChangeAspect="1"/>
+          </p:cNvPicPr>
+          <p:nvPr/>
+        </p:nvPicPr>
+        <p:blipFill>
+          <a:blip r:embed="rId2"/>
+          <a:stretch>
+            <a:fillRect/>
+          </a:stretch>
+        </p:blipFill>
+        <p:spPr>
+          <a:xfrm>
+            <a:off x="5828715" y="1451136"/>
+            <a:ext cx="4245675" cy="5041739"/>
+          </a:xfrm>
+          <a:prstGeom prst="rect">
+            <a:avLst/>
+          </a:prstGeom>
+        </p:spPr>
+      </p:pic>
+      <p:pic>
+        <p:nvPicPr>
+          <p:cNvPr id="6" name="図 5" descr="グラフ&#10;&#10;自動的に生成された説明">
+            <a:extLst>
+              <a:ext uri="{FF2B5EF4-FFF2-40B4-BE49-F238E27FC236}">
+                <a16:creationId xmlns:a16="http://schemas.microsoft.com/office/drawing/2014/main" id="{123AED97-D079-6049-85EB-8AEC9AF14149}"/>
+              </a:ext>
+            </a:extLst>
+          </p:cNvPr>
+          <p:cNvPicPr>
+            <a:picLocks noChangeAspect="1"/>
+          </p:cNvPicPr>
+          <p:nvPr/>
+        </p:nvPicPr>
+        <p:blipFill>
+          <a:blip r:embed="rId3"/>
+          <a:stretch>
+            <a:fillRect/>
+          </a:stretch>
+        </p:blipFill>
+        <p:spPr>
+          <a:xfrm>
+            <a:off x="662676" y="1451136"/>
+            <a:ext cx="4245675" cy="5041739"/>
+          </a:xfrm>
+          <a:prstGeom prst="rect">
+            <a:avLst/>
+          </a:prstGeom>
+        </p:spPr>
+      </p:pic>
     </p:spTree>
     <p:extLst>
       <p:ext uri="{BB962C8B-B14F-4D97-AF65-F5344CB8AC3E}">
@@ -5069,7 +5231,7 @@
           <p:cNvPr id="2" name="タイトル 1">
             <a:extLst>
               <a:ext uri="{FF2B5EF4-FFF2-40B4-BE49-F238E27FC236}">
-                <a16:creationId xmlns:a16="http://schemas.microsoft.com/office/drawing/2014/main" id="{246B606E-7A53-DD46-8CF2-F40D6405A535}"/>
+                <a16:creationId xmlns:a16="http://schemas.microsoft.com/office/drawing/2014/main" id="{5D713ADD-4A62-9941-B957-4A328FA95493}"/>
               </a:ext>
             </a:extLst>
           </p:cNvPr>
@@ -5086,16 +5248,47 @@
           <a:lstStyle/>
           <a:p>
             <a:r>
-              <a:rPr kumimoji="1" lang="ja-JP" altLang="en-US"/>
-              <a:t>補足</a:t>
-            </a:r>
-          </a:p>
-        </p:txBody>
-      </p:sp>
+              <a:rPr lang="ja-JP" altLang="en-US"/>
+              <a:t>特徴量を追加した際の混合行列</a:t>
+            </a:r>
+            <a:endParaRPr kumimoji="1" lang="ja-JP" altLang="en-US"/>
+          </a:p>
+        </p:txBody>
+      </p:sp>
+      <p:pic>
+        <p:nvPicPr>
+          <p:cNvPr id="4" name="図 3" descr="グラフィカル ユーザー インターフェイス, アプリケーション, Teams&#10;&#10;自動的に生成された説明">
+            <a:extLst>
+              <a:ext uri="{FF2B5EF4-FFF2-40B4-BE49-F238E27FC236}">
+                <a16:creationId xmlns:a16="http://schemas.microsoft.com/office/drawing/2014/main" id="{7F49094A-E2BC-3843-9AC1-CAB834E575F2}"/>
+              </a:ext>
+            </a:extLst>
+          </p:cNvPr>
+          <p:cNvPicPr>
+            <a:picLocks noChangeAspect="1"/>
+          </p:cNvPicPr>
+          <p:nvPr/>
+        </p:nvPicPr>
+        <p:blipFill>
+          <a:blip r:embed="rId2"/>
+          <a:stretch>
+            <a:fillRect/>
+          </a:stretch>
+        </p:blipFill>
+        <p:spPr>
+          <a:xfrm>
+            <a:off x="838200" y="2055635"/>
+            <a:ext cx="5585178" cy="4188884"/>
+          </a:xfrm>
+          <a:prstGeom prst="rect">
+            <a:avLst/>
+          </a:prstGeom>
+        </p:spPr>
+      </p:pic>
     </p:spTree>
     <p:extLst>
       <p:ext uri="{BB962C8B-B14F-4D97-AF65-F5344CB8AC3E}">
-        <p14:creationId xmlns:p14="http://schemas.microsoft.com/office/powerpoint/2010/main" val="2246600387"/>
+        <p14:creationId xmlns:p14="http://schemas.microsoft.com/office/powerpoint/2010/main" val="1605271704"/>
       </p:ext>
     </p:extLst>
   </p:cSld>
@@ -5127,7 +5320,7 @@
           <p:cNvPr id="2" name="タイトル 1">
             <a:extLst>
               <a:ext uri="{FF2B5EF4-FFF2-40B4-BE49-F238E27FC236}">
-                <a16:creationId xmlns:a16="http://schemas.microsoft.com/office/drawing/2014/main" id="{DE0C7C4F-2B56-3643-8F87-A8BC080E7ED8}"/>
+                <a16:creationId xmlns:a16="http://schemas.microsoft.com/office/drawing/2014/main" id="{246B606E-7A53-DD46-8CF2-F40D6405A535}"/>
               </a:ext>
             </a:extLst>
           </p:cNvPr>
@@ -5138,58 +5331,22 @@
             <p:ph type="title"/>
           </p:nvPr>
         </p:nvSpPr>
-        <p:spPr>
-          <a:xfrm>
-            <a:off x="244998" y="237804"/>
-            <a:ext cx="11702004" cy="1325563"/>
-          </a:xfrm>
-        </p:spPr>
+        <p:spPr/>
         <p:txBody>
           <a:bodyPr/>
           <a:lstStyle/>
           <a:p>
             <a:r>
-              <a:rPr kumimoji="1" lang="en-US" altLang="ja-JP" dirty="0"/>
-              <a:t>Pocket Similarity Search using Multi-Sketches</a:t>
-            </a:r>
-            <a:endParaRPr kumimoji="1" lang="ja-JP" altLang="en-US"/>
-          </a:p>
-        </p:txBody>
-      </p:sp>
-      <p:pic>
-        <p:nvPicPr>
-          <p:cNvPr id="4" name="図 3" descr="テキスト&#10;&#10;自動的に生成された説明">
-            <a:extLst>
-              <a:ext uri="{FF2B5EF4-FFF2-40B4-BE49-F238E27FC236}">
-                <a16:creationId xmlns:a16="http://schemas.microsoft.com/office/drawing/2014/main" id="{015DFF27-E8D5-AB44-8D40-1A3074C837CF}"/>
-              </a:ext>
-            </a:extLst>
-          </p:cNvPr>
-          <p:cNvPicPr>
-            <a:picLocks noChangeAspect="1"/>
-          </p:cNvPicPr>
-          <p:nvPr/>
-        </p:nvPicPr>
-        <p:blipFill>
-          <a:blip r:embed="rId2"/>
-          <a:stretch>
-            <a:fillRect/>
-          </a:stretch>
-        </p:blipFill>
-        <p:spPr>
-          <a:xfrm>
-            <a:off x="1933764" y="1415842"/>
-            <a:ext cx="7302833" cy="5543757"/>
-          </a:xfrm>
-          <a:prstGeom prst="rect">
-            <a:avLst/>
-          </a:prstGeom>
-        </p:spPr>
-      </p:pic>
+              <a:rPr kumimoji="1" lang="ja-JP" altLang="en-US"/>
+              <a:t>補足</a:t>
+            </a:r>
+          </a:p>
+        </p:txBody>
+      </p:sp>
     </p:spTree>
     <p:extLst>
       <p:ext uri="{BB962C8B-B14F-4D97-AF65-F5344CB8AC3E}">
-        <p14:creationId xmlns:p14="http://schemas.microsoft.com/office/powerpoint/2010/main" val="1137347460"/>
+        <p14:creationId xmlns:p14="http://schemas.microsoft.com/office/powerpoint/2010/main" val="2246600387"/>
       </p:ext>
     </p:extLst>
   </p:cSld>
@@ -5221,7 +5378,7 @@
           <p:cNvPr id="2" name="タイトル 1">
             <a:extLst>
               <a:ext uri="{FF2B5EF4-FFF2-40B4-BE49-F238E27FC236}">
-                <a16:creationId xmlns:a16="http://schemas.microsoft.com/office/drawing/2014/main" id="{D05BC586-F069-884B-BE37-565936750D51}"/>
+                <a16:creationId xmlns:a16="http://schemas.microsoft.com/office/drawing/2014/main" id="{DE0C7C4F-2B56-3643-8F87-A8BC080E7ED8}"/>
               </a:ext>
             </a:extLst>
           </p:cNvPr>
@@ -5234,8 +5391,8 @@
         </p:nvSpPr>
         <p:spPr>
           <a:xfrm>
-            <a:off x="424453" y="365125"/>
-            <a:ext cx="11439598" cy="1325563"/>
+            <a:off x="244998" y="237804"/>
+            <a:ext cx="11702004" cy="1325563"/>
           </a:xfrm>
         </p:spPr>
         <p:txBody>
@@ -5243,7 +5400,7 @@
           <a:lstStyle/>
           <a:p>
             <a:r>
-              <a:rPr lang="en-US" altLang="ja-JP" dirty="0"/>
+              <a:rPr kumimoji="1" lang="en-US" altLang="ja-JP" dirty="0"/>
               <a:t>Pocket Similarity Search using Multi-Sketches</a:t>
             </a:r>
             <a:endParaRPr kumimoji="1" lang="ja-JP" altLang="en-US"/>
@@ -5252,10 +5409,10 @@
       </p:sp>
       <p:pic>
         <p:nvPicPr>
-          <p:cNvPr id="4" name="図 3" descr="グラフィカル ユーザー インターフェイス&#10;&#10;中程度の精度で自動的に生成された説明">
-            <a:extLst>
-              <a:ext uri="{FF2B5EF4-FFF2-40B4-BE49-F238E27FC236}">
-                <a16:creationId xmlns:a16="http://schemas.microsoft.com/office/drawing/2014/main" id="{37E0FB6B-530C-CD40-AF37-E83445370764}"/>
+          <p:cNvPr id="4" name="図 3" descr="テキスト&#10;&#10;自動的に生成された説明">
+            <a:extLst>
+              <a:ext uri="{FF2B5EF4-FFF2-40B4-BE49-F238E27FC236}">
+                <a16:creationId xmlns:a16="http://schemas.microsoft.com/office/drawing/2014/main" id="{015DFF27-E8D5-AB44-8D40-1A3074C837CF}"/>
               </a:ext>
             </a:extLst>
           </p:cNvPr>
@@ -5272,8 +5429,8 @@
         </p:blipFill>
         <p:spPr>
           <a:xfrm>
-            <a:off x="2346837" y="1426741"/>
-            <a:ext cx="7176304" cy="5278008"/>
+            <a:off x="1933764" y="1415842"/>
+            <a:ext cx="7302833" cy="5543757"/>
           </a:xfrm>
           <a:prstGeom prst="rect">
             <a:avLst/>
@@ -5283,7 +5440,7 @@
     </p:spTree>
     <p:extLst>
       <p:ext uri="{BB962C8B-B14F-4D97-AF65-F5344CB8AC3E}">
-        <p14:creationId xmlns:p14="http://schemas.microsoft.com/office/powerpoint/2010/main" val="1082442366"/>
+        <p14:creationId xmlns:p14="http://schemas.microsoft.com/office/powerpoint/2010/main" val="1137347460"/>
       </p:ext>
     </p:extLst>
   </p:cSld>

</xml_diff>